<commit_message>
Refactoring BMI und Dijkstra
</commit_message>
<xml_diff>
--- a/VO-Teil-1/Handlungsanleitungen/dijkstra/Dijkstra.pptx
+++ b/VO-Teil-1/Handlungsanleitungen/dijkstra/Dijkstra.pptx
@@ -215,7 +215,7 @@
           <a:p>
             <a:fld id="{9A10E839-EEF2-CB45-B116-351C86449AB6}" type="datetimeFigureOut">
               <a:rPr lang="de-DE" smtClean="0"/>
-              <a:t>03.05.23</a:t>
+              <a:t>11.05.23</a:t>
             </a:fld>
             <a:endParaRPr lang="de-DE"/>
           </a:p>
@@ -713,7 +713,7 @@
           <a:p>
             <a:fld id="{0DAF61AA-5A98-4049-A93E-477E5505141A}" type="datetimeFigureOut">
               <a:rPr lang="en-US" smtClean="0"/>
-              <a:t>5/3/23</a:t>
+              <a:t>5/11/23</a:t>
             </a:fld>
             <a:endParaRPr lang="en-US" dirty="0"/>
           </a:p>
@@ -911,7 +911,7 @@
           <a:p>
             <a:fld id="{0DAF61AA-5A98-4049-A93E-477E5505141A}" type="datetimeFigureOut">
               <a:rPr lang="en-US" smtClean="0"/>
-              <a:t>5/3/23</a:t>
+              <a:t>5/11/23</a:t>
             </a:fld>
             <a:endParaRPr lang="en-US"/>
           </a:p>
@@ -1119,7 +1119,7 @@
           <a:p>
             <a:fld id="{0DAF61AA-5A98-4049-A93E-477E5505141A}" type="datetimeFigureOut">
               <a:rPr lang="en-US" smtClean="0"/>
-              <a:t>5/3/23</a:t>
+              <a:t>5/11/23</a:t>
             </a:fld>
             <a:endParaRPr lang="en-US"/>
           </a:p>
@@ -1317,7 +1317,7 @@
           <a:p>
             <a:fld id="{0DAF61AA-5A98-4049-A93E-477E5505141A}" type="datetimeFigureOut">
               <a:rPr lang="en-US" smtClean="0"/>
-              <a:t>5/3/23</a:t>
+              <a:t>5/11/23</a:t>
             </a:fld>
             <a:endParaRPr lang="en-US"/>
           </a:p>
@@ -1592,7 +1592,7 @@
           <a:p>
             <a:fld id="{0DAF61AA-5A98-4049-A93E-477E5505141A}" type="datetimeFigureOut">
               <a:rPr lang="en-US" smtClean="0"/>
-              <a:t>5/3/23</a:t>
+              <a:t>5/11/23</a:t>
             </a:fld>
             <a:endParaRPr lang="en-US"/>
           </a:p>
@@ -1857,7 +1857,7 @@
           <a:p>
             <a:fld id="{0DAF61AA-5A98-4049-A93E-477E5505141A}" type="datetimeFigureOut">
               <a:rPr lang="en-US" smtClean="0"/>
-              <a:t>5/3/23</a:t>
+              <a:t>5/11/23</a:t>
             </a:fld>
             <a:endParaRPr lang="en-US"/>
           </a:p>
@@ -2269,7 +2269,7 @@
           <a:p>
             <a:fld id="{0DAF61AA-5A98-4049-A93E-477E5505141A}" type="datetimeFigureOut">
               <a:rPr lang="en-US" smtClean="0"/>
-              <a:t>5/3/23</a:t>
+              <a:t>5/11/23</a:t>
             </a:fld>
             <a:endParaRPr lang="en-US"/>
           </a:p>
@@ -2410,7 +2410,7 @@
           <a:p>
             <a:fld id="{0DAF61AA-5A98-4049-A93E-477E5505141A}" type="datetimeFigureOut">
               <a:rPr lang="en-US" smtClean="0"/>
-              <a:t>5/3/23</a:t>
+              <a:t>5/11/23</a:t>
             </a:fld>
             <a:endParaRPr lang="en-US"/>
           </a:p>
@@ -2523,7 +2523,7 @@
           <a:p>
             <a:fld id="{0DAF61AA-5A98-4049-A93E-477E5505141A}" type="datetimeFigureOut">
               <a:rPr lang="en-US" smtClean="0"/>
-              <a:t>5/3/23</a:t>
+              <a:t>5/11/23</a:t>
             </a:fld>
             <a:endParaRPr lang="en-US"/>
           </a:p>
@@ -2834,7 +2834,7 @@
           <a:p>
             <a:fld id="{0DAF61AA-5A98-4049-A93E-477E5505141A}" type="datetimeFigureOut">
               <a:rPr lang="en-US" smtClean="0"/>
-              <a:t>5/3/23</a:t>
+              <a:t>5/11/23</a:t>
             </a:fld>
             <a:endParaRPr lang="en-US"/>
           </a:p>
@@ -3125,7 +3125,7 @@
           <a:p>
             <a:fld id="{0DAF61AA-5A98-4049-A93E-477E5505141A}" type="datetimeFigureOut">
               <a:rPr lang="en-US" smtClean="0"/>
-              <a:t>5/3/23</a:t>
+              <a:t>5/11/23</a:t>
             </a:fld>
             <a:endParaRPr lang="en-US"/>
           </a:p>
@@ -6813,7 +6813,7 @@
             <a:fld id="{0DAF61AA-5A98-4049-A93E-477E5505141A}" type="datetimeFigureOut">
               <a:rPr lang="en-US" smtClean="0"/>
               <a:pPr/>
-              <a:t>5/3/23</a:t>
+              <a:t>5/11/23</a:t>
             </a:fld>
             <a:endParaRPr lang="en-US" dirty="0"/>
           </a:p>
@@ -11111,6 +11111,18 @@
   <p:clrMapOvr>
     <a:masterClrMapping/>
   </p:clrMapOvr>
+  <mc:AlternateContent xmlns:mc="http://schemas.openxmlformats.org/markup-compatibility/2006">
+    <mc:Choice xmlns:p159="http://schemas.microsoft.com/office/powerpoint/2015/09/main" Requires="p159">
+      <p:transition xmlns:p14="http://schemas.microsoft.com/office/powerpoint/2010/main" spd="slow" p14:dur="3000">
+        <p159:morph option="byObject"/>
+      </p:transition>
+    </mc:Choice>
+    <mc:Fallback>
+      <p:transition spd="slow">
+        <p:fade/>
+      </p:transition>
+    </mc:Fallback>
+  </mc:AlternateContent>
 </p:sld>
 </file>
 
@@ -13552,6 +13564,18 @@
   <p:clrMapOvr>
     <a:masterClrMapping/>
   </p:clrMapOvr>
+  <mc:AlternateContent xmlns:mc="http://schemas.openxmlformats.org/markup-compatibility/2006">
+    <mc:Choice xmlns:p159="http://schemas.microsoft.com/office/powerpoint/2015/09/main" Requires="p159">
+      <p:transition xmlns:p14="http://schemas.microsoft.com/office/powerpoint/2010/main" spd="slow" p14:dur="3000">
+        <p159:morph option="byObject"/>
+      </p:transition>
+    </mc:Choice>
+    <mc:Fallback>
+      <p:transition spd="slow">
+        <p:fade/>
+      </p:transition>
+    </mc:Fallback>
+  </mc:AlternateContent>
 </p:sld>
 </file>
 
@@ -15978,6 +16002,18 @@
   <p:clrMapOvr>
     <a:masterClrMapping/>
   </p:clrMapOvr>
+  <mc:AlternateContent xmlns:mc="http://schemas.openxmlformats.org/markup-compatibility/2006">
+    <mc:Choice xmlns:p159="http://schemas.microsoft.com/office/powerpoint/2015/09/main" Requires="p159">
+      <p:transition xmlns:p14="http://schemas.microsoft.com/office/powerpoint/2010/main" spd="slow" p14:dur="3000">
+        <p159:morph option="byObject"/>
+      </p:transition>
+    </mc:Choice>
+    <mc:Fallback>
+      <p:transition spd="slow">
+        <p:fade/>
+      </p:transition>
+    </mc:Fallback>
+  </mc:AlternateContent>
 </p:sld>
 </file>
 
@@ -18494,6 +18530,18 @@
   <p:clrMapOvr>
     <a:masterClrMapping/>
   </p:clrMapOvr>
+  <mc:AlternateContent xmlns:mc="http://schemas.openxmlformats.org/markup-compatibility/2006">
+    <mc:Choice xmlns:p159="http://schemas.microsoft.com/office/powerpoint/2015/09/main" Requires="p159">
+      <p:transition xmlns:p14="http://schemas.microsoft.com/office/powerpoint/2010/main" spd="slow" p14:dur="3000">
+        <p159:morph option="byObject"/>
+      </p:transition>
+    </mc:Choice>
+    <mc:Fallback>
+      <p:transition spd="slow">
+        <p:fade/>
+      </p:transition>
+    </mc:Fallback>
+  </mc:AlternateContent>
 </p:sld>
 </file>
 
@@ -20967,6 +21015,18 @@
   <p:clrMapOvr>
     <a:masterClrMapping/>
   </p:clrMapOvr>
+  <mc:AlternateContent xmlns:mc="http://schemas.openxmlformats.org/markup-compatibility/2006">
+    <mc:Choice xmlns:p159="http://schemas.microsoft.com/office/powerpoint/2015/09/main" Requires="p159">
+      <p:transition xmlns:p14="http://schemas.microsoft.com/office/powerpoint/2010/main" spd="slow" p14:dur="3000">
+        <p159:morph option="byObject"/>
+      </p:transition>
+    </mc:Choice>
+    <mc:Fallback>
+      <p:transition spd="slow">
+        <p:fade/>
+      </p:transition>
+    </mc:Fallback>
+  </mc:AlternateContent>
 </p:sld>
 </file>
 
@@ -23477,6 +23537,18 @@
   <p:clrMapOvr>
     <a:masterClrMapping/>
   </p:clrMapOvr>
+  <mc:AlternateContent xmlns:mc="http://schemas.openxmlformats.org/markup-compatibility/2006">
+    <mc:Choice xmlns:p159="http://schemas.microsoft.com/office/powerpoint/2015/09/main" Requires="p159">
+      <p:transition xmlns:p14="http://schemas.microsoft.com/office/powerpoint/2010/main" spd="slow" p14:dur="3000">
+        <p159:morph option="byObject"/>
+      </p:transition>
+    </mc:Choice>
+    <mc:Fallback>
+      <p:transition spd="slow">
+        <p:fade/>
+      </p:transition>
+    </mc:Fallback>
+  </mc:AlternateContent>
 </p:sld>
 </file>
 
@@ -25968,6 +26040,18 @@
   <p:clrMapOvr>
     <a:masterClrMapping/>
   </p:clrMapOvr>
+  <mc:AlternateContent xmlns:mc="http://schemas.openxmlformats.org/markup-compatibility/2006">
+    <mc:Choice xmlns:p159="http://schemas.microsoft.com/office/powerpoint/2015/09/main" Requires="p159">
+      <p:transition xmlns:p14="http://schemas.microsoft.com/office/powerpoint/2010/main" spd="slow" p14:dur="3000">
+        <p159:morph option="byObject"/>
+      </p:transition>
+    </mc:Choice>
+    <mc:Fallback>
+      <p:transition spd="slow">
+        <p:fade/>
+      </p:transition>
+    </mc:Fallback>
+  </mc:AlternateContent>
 </p:sld>
 </file>
 
@@ -28496,6 +28580,18 @@
   <p:clrMapOvr>
     <a:masterClrMapping/>
   </p:clrMapOvr>
+  <mc:AlternateContent xmlns:mc="http://schemas.openxmlformats.org/markup-compatibility/2006">
+    <mc:Choice xmlns:p159="http://schemas.microsoft.com/office/powerpoint/2015/09/main" Requires="p159">
+      <p:transition xmlns:p14="http://schemas.microsoft.com/office/powerpoint/2010/main" spd="slow" p14:dur="3000">
+        <p159:morph option="byObject"/>
+      </p:transition>
+    </mc:Choice>
+    <mc:Fallback>
+      <p:transition spd="slow">
+        <p:fade/>
+      </p:transition>
+    </mc:Fallback>
+  </mc:AlternateContent>
 </p:sld>
 </file>
 
@@ -29346,7 +29442,11 @@
           <a:prstGeom prst="line">
             <a:avLst/>
           </a:prstGeom>
-          <a:ln w="25400"/>
+          <a:ln w="25400">
+            <a:solidFill>
+              <a:schemeClr val="accent6"/>
+            </a:solidFill>
+          </a:ln>
         </p:spPr>
         <p:style>
           <a:lnRef idx="1">
@@ -30702,14 +30802,21 @@
           <a:bodyPr wrap="none" rtlCol="0">
             <a:spAutoFit/>
           </a:bodyPr>
-          <a:lstStyle/>
+          <a:lstStyle>
+            <a:defPPr>
+              <a:defRPr lang="de-DE"/>
+            </a:defPPr>
+            <a:lvl1pPr>
+              <a:defRPr>
+                <a:solidFill>
+                  <a:schemeClr val="accent6"/>
+                </a:solidFill>
+              </a:defRPr>
+            </a:lvl1pPr>
+          </a:lstStyle>
           <a:p>
             <a:r>
-              <a:rPr lang="de-DE" dirty="0">
-                <a:solidFill>
-                  <a:schemeClr val="accent1"/>
-                </a:solidFill>
-              </a:rPr>
+              <a:rPr lang="de-DE" dirty="0"/>
               <a:t>11</a:t>
             </a:r>
           </a:p>
@@ -30997,6 +31104,18 @@
   <p:clrMapOvr>
     <a:masterClrMapping/>
   </p:clrMapOvr>
+  <mc:AlternateContent xmlns:mc="http://schemas.openxmlformats.org/markup-compatibility/2006">
+    <mc:Choice xmlns:p159="http://schemas.microsoft.com/office/powerpoint/2015/09/main" Requires="p159">
+      <p:transition xmlns:p14="http://schemas.microsoft.com/office/powerpoint/2010/main" spd="slow" p14:dur="3000">
+        <p159:morph option="byObject"/>
+      </p:transition>
+    </mc:Choice>
+    <mc:Fallback>
+      <p:transition spd="slow">
+        <p:fade/>
+      </p:transition>
+    </mc:Fallback>
+  </mc:AlternateContent>
 </p:sld>
 </file>
 
@@ -33539,6 +33658,18 @@
   <p:clrMapOvr>
     <a:masterClrMapping/>
   </p:clrMapOvr>
+  <mc:AlternateContent xmlns:mc="http://schemas.openxmlformats.org/markup-compatibility/2006">
+    <mc:Choice xmlns:p159="http://schemas.microsoft.com/office/powerpoint/2015/09/main" Requires="p159">
+      <p:transition xmlns:p14="http://schemas.microsoft.com/office/powerpoint/2010/main" spd="slow" p14:dur="3000">
+        <p159:morph option="byObject"/>
+      </p:transition>
+    </mc:Choice>
+    <mc:Fallback>
+      <p:transition spd="slow">
+        <p:fade/>
+      </p:transition>
+    </mc:Fallback>
+  </mc:AlternateContent>
 </p:sld>
 </file>
 
@@ -36022,6 +36153,18 @@
   <p:clrMapOvr>
     <a:masterClrMapping/>
   </p:clrMapOvr>
+  <mc:AlternateContent xmlns:mc="http://schemas.openxmlformats.org/markup-compatibility/2006">
+    <mc:Choice xmlns:p159="http://schemas.microsoft.com/office/powerpoint/2015/09/main" Requires="p159">
+      <p:transition xmlns:p14="http://schemas.microsoft.com/office/powerpoint/2010/main" spd="slow" p14:dur="3000">
+        <p159:morph option="byObject"/>
+      </p:transition>
+    </mc:Choice>
+    <mc:Fallback>
+      <p:transition spd="slow">
+        <p:fade/>
+      </p:transition>
+    </mc:Fallback>
+  </mc:AlternateContent>
 </p:sld>
 </file>
 
@@ -38164,6 +38307,18 @@
   <p:clrMapOvr>
     <a:masterClrMapping/>
   </p:clrMapOvr>
+  <mc:AlternateContent xmlns:mc="http://schemas.openxmlformats.org/markup-compatibility/2006">
+    <mc:Choice xmlns:p159="http://schemas.microsoft.com/office/powerpoint/2015/09/main" Requires="p159">
+      <p:transition xmlns:p14="http://schemas.microsoft.com/office/powerpoint/2010/main" spd="slow" p14:dur="3000">
+        <p159:morph option="byObject"/>
+      </p:transition>
+    </mc:Choice>
+    <mc:Fallback>
+      <p:transition spd="slow">
+        <p:fade/>
+      </p:transition>
+    </mc:Fallback>
+  </mc:AlternateContent>
 </p:sld>
 </file>
 
@@ -40386,6 +40541,18 @@
   <p:clrMapOvr>
     <a:masterClrMapping/>
   </p:clrMapOvr>
+  <mc:AlternateContent xmlns:mc="http://schemas.openxmlformats.org/markup-compatibility/2006">
+    <mc:Choice xmlns:p159="http://schemas.microsoft.com/office/powerpoint/2015/09/main" Requires="p159">
+      <p:transition xmlns:p14="http://schemas.microsoft.com/office/powerpoint/2010/main" spd="slow" p14:dur="3000">
+        <p159:morph option="byObject"/>
+      </p:transition>
+    </mc:Choice>
+    <mc:Fallback>
+      <p:transition spd="slow">
+        <p:fade/>
+      </p:transition>
+    </mc:Fallback>
+  </mc:AlternateContent>
 </p:sld>
 </file>
 
@@ -42751,6 +42918,18 @@
   <p:clrMapOvr>
     <a:masterClrMapping/>
   </p:clrMapOvr>
+  <mc:AlternateContent xmlns:mc="http://schemas.openxmlformats.org/markup-compatibility/2006">
+    <mc:Choice xmlns:p159="http://schemas.microsoft.com/office/powerpoint/2015/09/main" Requires="p159">
+      <p:transition xmlns:p14="http://schemas.microsoft.com/office/powerpoint/2010/main" spd="slow" p14:dur="3000">
+        <p159:morph option="byObject"/>
+      </p:transition>
+    </mc:Choice>
+    <mc:Fallback>
+      <p:transition spd="slow">
+        <p:fade/>
+      </p:transition>
+    </mc:Fallback>
+  </mc:AlternateContent>
 </p:sld>
 </file>
 
@@ -45101,6 +45280,18 @@
   <p:clrMapOvr>
     <a:masterClrMapping/>
   </p:clrMapOvr>
+  <mc:AlternateContent xmlns:mc="http://schemas.openxmlformats.org/markup-compatibility/2006">
+    <mc:Choice xmlns:p159="http://schemas.microsoft.com/office/powerpoint/2015/09/main" Requires="p159">
+      <p:transition xmlns:p14="http://schemas.microsoft.com/office/powerpoint/2010/main" spd="slow" p14:dur="3000">
+        <p159:morph option="byObject"/>
+      </p:transition>
+    </mc:Choice>
+    <mc:Fallback>
+      <p:transition spd="slow">
+        <p:fade/>
+      </p:transition>
+    </mc:Fallback>
+  </mc:AlternateContent>
 </p:sld>
 </file>
 
@@ -47522,6 +47713,18 @@
   <p:clrMapOvr>
     <a:masterClrMapping/>
   </p:clrMapOvr>
+  <mc:AlternateContent xmlns:mc="http://schemas.openxmlformats.org/markup-compatibility/2006">
+    <mc:Choice xmlns:p159="http://schemas.microsoft.com/office/powerpoint/2015/09/main" Requires="p159">
+      <p:transition xmlns:p14="http://schemas.microsoft.com/office/powerpoint/2010/main" spd="slow" p14:dur="3000">
+        <p159:morph option="byObject"/>
+      </p:transition>
+    </mc:Choice>
+    <mc:Fallback>
+      <p:transition spd="slow">
+        <p:fade/>
+      </p:transition>
+    </mc:Fallback>
+  </mc:AlternateContent>
 </p:sld>
 </file>
 
@@ -49882,6 +50085,18 @@
   <p:clrMapOvr>
     <a:masterClrMapping/>
   </p:clrMapOvr>
+  <mc:AlternateContent xmlns:mc="http://schemas.openxmlformats.org/markup-compatibility/2006">
+    <mc:Choice xmlns:p159="http://schemas.microsoft.com/office/powerpoint/2015/09/main" Requires="p159">
+      <p:transition xmlns:p14="http://schemas.microsoft.com/office/powerpoint/2010/main" spd="slow" p14:dur="3000">
+        <p159:morph option="byObject"/>
+      </p:transition>
+    </mc:Choice>
+    <mc:Fallback>
+      <p:transition spd="slow">
+        <p:fade/>
+      </p:transition>
+    </mc:Fallback>
+  </mc:AlternateContent>
 </p:sld>
 </file>
 
@@ -52303,6 +52518,18 @@
   <p:clrMapOvr>
     <a:masterClrMapping/>
   </p:clrMapOvr>
+  <mc:AlternateContent xmlns:mc="http://schemas.openxmlformats.org/markup-compatibility/2006">
+    <mc:Choice xmlns:p159="http://schemas.microsoft.com/office/powerpoint/2015/09/main" Requires="p159">
+      <p:transition xmlns:p14="http://schemas.microsoft.com/office/powerpoint/2010/main" spd="slow" p14:dur="3000">
+        <p159:morph option="byObject"/>
+      </p:transition>
+    </mc:Choice>
+    <mc:Fallback>
+      <p:transition spd="slow">
+        <p:fade/>
+      </p:transition>
+    </mc:Fallback>
+  </mc:AlternateContent>
 </p:sld>
 </file>
 
@@ -54707,6 +54934,18 @@
   <p:clrMapOvr>
     <a:masterClrMapping/>
   </p:clrMapOvr>
+  <mc:AlternateContent xmlns:mc="http://schemas.openxmlformats.org/markup-compatibility/2006">
+    <mc:Choice xmlns:p159="http://schemas.microsoft.com/office/powerpoint/2015/09/main" Requires="p159">
+      <p:transition xmlns:p14="http://schemas.microsoft.com/office/powerpoint/2010/main" spd="slow" p14:dur="3000">
+        <p159:morph option="byObject"/>
+      </p:transition>
+    </mc:Choice>
+    <mc:Fallback>
+      <p:transition spd="slow">
+        <p:fade/>
+      </p:transition>
+    </mc:Fallback>
+  </mc:AlternateContent>
 </p:sld>
 </file>
 

</xml_diff>